<commit_message>
Presentation + projet final : Examen
</commit_message>
<xml_diff>
--- a/ProjetFinal/Données Sociales.pptx
+++ b/ProjetFinal/Données Sociales.pptx
@@ -111,6 +111,11 @@
       </a:defRPr>
     </a:lvl9pPr>
   </p:defaultTextStyle>
+  <p:extLst>
+    <p:ext uri="{EFAFB233-063F-42B5-8137-9DF3F51BA10A}">
+      <p15:sldGuideLst xmlns:p15="http://schemas.microsoft.com/office/powerpoint/2012/main"/>
+    </p:ext>
+  </p:extLst>
 </p:presentation>
 </file>
 
@@ -450,7 +455,7 @@
             <a:fld id="{5923F103-BC34-4FE4-A40E-EDDEECFDA5D0}" type="datetimeFigureOut">
               <a:rPr lang="en-US" dirty="0"/>
               <a:pPr/>
-              <a:t>3/6/2017</a:t>
+              <a:t>3/8/2017</a:t>
             </a:fld>
             <a:endParaRPr lang="en-US" dirty="0"/>
           </a:p>
@@ -1538,7 +1543,7 @@
           <a:p>
             <a:fld id="{923A1CC3-2375-41D4-9E03-427CAF2A4C1A}" type="datetimeFigureOut">
               <a:rPr lang="en-US" dirty="0"/>
-              <a:t>3/6/2017</a:t>
+              <a:t>3/8/2017</a:t>
             </a:fld>
             <a:endParaRPr lang="en-US" dirty="0"/>
           </a:p>
@@ -2518,7 +2523,7 @@
           <a:p>
             <a:fld id="{AFF16868-8199-4C2C-A5B1-63AEE139F88E}" type="datetimeFigureOut">
               <a:rPr lang="en-US" dirty="0"/>
-              <a:t>3/6/2017</a:t>
+              <a:t>3/8/2017</a:t>
             </a:fld>
             <a:endParaRPr lang="en-US" dirty="0"/>
           </a:p>
@@ -3652,7 +3657,7 @@
           <a:p>
             <a:fld id="{AAD9FF7F-6988-44CC-821B-644E70CD2F73}" type="datetimeFigureOut">
               <a:rPr lang="en-US" dirty="0"/>
-              <a:t>3/6/2017</a:t>
+              <a:t>3/8/2017</a:t>
             </a:fld>
             <a:endParaRPr lang="en-US" dirty="0"/>
           </a:p>
@@ -4685,7 +4690,7 @@
           <a:p>
             <a:fld id="{5C12C299-16B2-4475-990D-751901EACC14}" type="datetimeFigureOut">
               <a:rPr lang="en-US" dirty="0"/>
-              <a:t>3/6/2017</a:t>
+              <a:t>3/8/2017</a:t>
             </a:fld>
             <a:endParaRPr lang="en-US" dirty="0"/>
           </a:p>
@@ -5345,7 +5350,7 @@
           <a:p>
             <a:fld id="{9FE86839-B9D8-4651-8783-F325ECE74E65}" type="datetimeFigureOut">
               <a:rPr lang="en-US" dirty="0"/>
-              <a:t>3/6/2017</a:t>
+              <a:t>3/8/2017</a:t>
             </a:fld>
             <a:endParaRPr lang="en-US" dirty="0"/>
           </a:p>
@@ -6206,7 +6211,7 @@
           <a:p>
             <a:fld id="{FD484F64-32F6-45C5-931F-ADC1662401D0}" type="datetimeFigureOut">
               <a:rPr lang="en-US" dirty="0"/>
-              <a:t>3/6/2017</a:t>
+              <a:t>3/8/2017</a:t>
             </a:fld>
             <a:endParaRPr lang="en-US" dirty="0"/>
           </a:p>
@@ -6396,7 +6401,7 @@
           <a:p>
             <a:fld id="{53086D93-FCAC-47E0-A2EE-787E62CA814C}" type="datetimeFigureOut">
               <a:rPr lang="en-US" dirty="0"/>
-              <a:t>3/6/2017</a:t>
+              <a:t>3/8/2017</a:t>
             </a:fld>
             <a:endParaRPr lang="en-US" dirty="0"/>
           </a:p>
@@ -7368,7 +7373,7 @@
           <a:p>
             <a:fld id="{CDA879A6-0FD0-4734-A311-86BFCA472E6E}" type="datetimeFigureOut">
               <a:rPr lang="en-US" dirty="0"/>
-              <a:t>3/6/2017</a:t>
+              <a:t>3/8/2017</a:t>
             </a:fld>
             <a:endParaRPr lang="en-US" dirty="0"/>
           </a:p>
@@ -7579,7 +7584,7 @@
           <a:p>
             <a:fld id="{19C9CA7B-DFD4-44B5-8C60-D14B8CD1FB59}" type="datetimeFigureOut">
               <a:rPr lang="en-US" dirty="0"/>
-              <a:t>3/6/2017</a:t>
+              <a:t>3/8/2017</a:t>
             </a:fld>
             <a:endParaRPr lang="en-US" dirty="0"/>
           </a:p>
@@ -8613,7 +8618,7 @@
           <a:p>
             <a:fld id="{F34E6425-0181-43F2-84FC-787E803FD2F8}" type="datetimeFigureOut">
               <a:rPr lang="en-US" dirty="0"/>
-              <a:t>3/6/2017</a:t>
+              <a:t>3/8/2017</a:t>
             </a:fld>
             <a:endParaRPr lang="en-US" dirty="0"/>
           </a:p>
@@ -8885,7 +8890,7 @@
           <a:p>
             <a:fld id="{3BDB8791-F1B0-41E7-B7FD-A781E65C4266}" type="datetimeFigureOut">
               <a:rPr lang="en-US" dirty="0"/>
-              <a:t>3/6/2017</a:t>
+              <a:t>3/8/2017</a:t>
             </a:fld>
             <a:endParaRPr lang="en-US" dirty="0"/>
           </a:p>
@@ -9295,7 +9300,7 @@
           <a:p>
             <a:fld id="{5FDD63B2-E120-4ED8-B27B-C685F510A5FE}" type="datetimeFigureOut">
               <a:rPr lang="en-US" dirty="0"/>
-              <a:t>3/6/2017</a:t>
+              <a:t>3/8/2017</a:t>
             </a:fld>
             <a:endParaRPr lang="en-US" dirty="0"/>
           </a:p>
@@ -9422,7 +9427,7 @@
           <a:p>
             <a:fld id="{7AA18ACC-A947-437B-A130-35BD54FDF1E9}" type="datetimeFigureOut">
               <a:rPr lang="en-US" dirty="0"/>
-              <a:t>3/6/2017</a:t>
+              <a:t>3/8/2017</a:t>
             </a:fld>
             <a:endParaRPr lang="en-US" dirty="0"/>
           </a:p>
@@ -9517,7 +9522,7 @@
           <a:p>
             <a:fld id="{7C8D7E02-BCB8-4D50-A234-369438C08659}" type="datetimeFigureOut">
               <a:rPr lang="en-US" dirty="0"/>
-              <a:t>3/6/2017</a:t>
+              <a:t>3/8/2017</a:t>
             </a:fld>
             <a:endParaRPr lang="en-US" dirty="0"/>
           </a:p>
@@ -10598,7 +10603,7 @@
           <a:p>
             <a:fld id="{76E86A4C-8E40-4F87-A4F0-01A0687C5742}" type="datetimeFigureOut">
               <a:rPr lang="en-US" dirty="0"/>
-              <a:t>3/6/2017</a:t>
+              <a:t>3/8/2017</a:t>
             </a:fld>
             <a:endParaRPr lang="en-US" dirty="0"/>
           </a:p>
@@ -11706,7 +11711,7 @@
           <a:p>
             <a:fld id="{35E72C73-2D91-4E12-BA25-F0AA0C03599B}" type="datetimeFigureOut">
               <a:rPr lang="en-US" dirty="0"/>
-              <a:t>3/6/2017</a:t>
+              <a:t>3/8/2017</a:t>
             </a:fld>
             <a:endParaRPr lang="en-US" dirty="0"/>
           </a:p>
@@ -12703,7 +12708,7 @@
           <a:p>
             <a:fld id="{2BE451C3-0FF4-47C4-B829-773ADF60F88C}" type="datetimeFigureOut">
               <a:rPr lang="en-US" dirty="0"/>
-              <a:t>3/6/2017</a:t>
+              <a:t>3/8/2017</a:t>
             </a:fld>
             <a:endParaRPr lang="en-US" dirty="0"/>
           </a:p>
@@ -13630,27 +13635,6 @@
               <a:t>Personnelles</a:t>
             </a:r>
           </a:p>
-          <a:p>
-            <a:pPr lvl="1"/>
-            <a:r>
-              <a:rPr lang="fr-FR" dirty="0"/>
-              <a:t>Travail</a:t>
-            </a:r>
-          </a:p>
-          <a:p>
-            <a:pPr lvl="1"/>
-            <a:r>
-              <a:rPr lang="fr-FR" dirty="0"/>
-              <a:t>Ecole, </a:t>
-            </a:r>
-          </a:p>
-          <a:p>
-            <a:pPr lvl="1"/>
-            <a:r>
-              <a:rPr lang="fr-FR" dirty="0"/>
-              <a:t>Personnels (santé : sommeil, angoisses)</a:t>
-            </a:r>
-          </a:p>
         </p:txBody>
       </p:sp>
       <p:pic>
@@ -13939,7 +13923,16 @@
               <a:rPr lang="fr-FR" dirty="0">
                 <a:sym typeface="Wingdings 2" panose="05020102010507070707" pitchFamily="18" charset="2"/>
               </a:rPr>
-              <a:t>Analyse ≈</a:t>
+              <a:t>Assemblage des données </a:t>
+            </a:r>
+            <a:r>
+              <a:rPr lang="fr-FR" dirty="0">
+                <a:solidFill>
+                  <a:srgbClr val="92D050"/>
+                </a:solidFill>
+                <a:sym typeface="Wingdings 2" panose="05020102010507070707" pitchFamily="18" charset="2"/>
+              </a:rPr>
+              <a:t></a:t>
             </a:r>
           </a:p>
           <a:p>
@@ -13947,17 +13940,14 @@
               <a:rPr lang="fr-FR" dirty="0">
                 <a:sym typeface="Wingdings 2" panose="05020102010507070707" pitchFamily="18" charset="2"/>
               </a:rPr>
-              <a:t>Assemblage des données </a:t>
-            </a:r>
-            <a:r>
-              <a:rPr lang="fr-FR" dirty="0">
-                <a:solidFill>
-                  <a:srgbClr val="FF0000"/>
-                </a:solidFill>
-                <a:sym typeface="Wingdings 2" panose="05020102010507070707" pitchFamily="18" charset="2"/>
-              </a:rPr>
-              <a:t></a:t>
-            </a:r>
+              <a:t>Analyse ≈</a:t>
+            </a:r>
+            <a:endParaRPr lang="fr-FR" dirty="0">
+              <a:solidFill>
+                <a:srgbClr val="FF0000"/>
+              </a:solidFill>
+              <a:sym typeface="Wingdings 2" panose="05020102010507070707" pitchFamily="18" charset="2"/>
+            </a:endParaRPr>
           </a:p>
           <a:p>
             <a:r>
@@ -14122,6 +14112,139 @@
         <p:txBody>
           <a:bodyPr/>
           <a:lstStyle/>
+          <a:p>
+            <a:r>
+              <a:rPr lang="fr-FR" dirty="0"/>
+              <a:t>Import de librairie : </a:t>
+            </a:r>
+            <a:r>
+              <a:rPr lang="fr-FR" dirty="0"/>
+              <a:t>import pandas as </a:t>
+            </a:r>
+            <a:r>
+              <a:rPr lang="fr-FR" dirty="0" err="1"/>
+              <a:t>pd</a:t>
+            </a:r>
+            <a:endParaRPr lang="fr-FR" dirty="0"/>
+          </a:p>
+          <a:p>
+            <a:r>
+              <a:rPr lang="fr-FR" dirty="0"/>
+              <a:t>Import des données : </a:t>
+            </a:r>
+            <a:r>
+              <a:rPr lang="fr-FR" dirty="0" err="1"/>
+              <a:t>dfRSA</a:t>
+            </a:r>
+            <a:r>
+              <a:rPr lang="fr-FR" dirty="0"/>
+              <a:t> = </a:t>
+            </a:r>
+            <a:r>
+              <a:rPr lang="fr-FR" dirty="0" err="1"/>
+              <a:t>pd.read_csv</a:t>
+            </a:r>
+            <a:r>
+              <a:rPr lang="fr-FR" dirty="0"/>
+              <a:t>('</a:t>
+            </a:r>
+            <a:r>
+              <a:rPr lang="fr-FR" dirty="0" err="1"/>
+              <a:t>donnees</a:t>
+            </a:r>
+            <a:r>
+              <a:rPr lang="fr-FR" dirty="0"/>
+              <a:t>/Beneficiaires_RSA_Commune.csv', header = 0)</a:t>
+            </a:r>
+          </a:p>
+          <a:p>
+            <a:r>
+              <a:rPr lang="fr-FR" dirty="0"/>
+              <a:t>Lecture des données : </a:t>
+            </a:r>
+            <a:r>
+              <a:rPr lang="fr-FR" dirty="0" err="1"/>
+              <a:t>dfRSA.head</a:t>
+            </a:r>
+            <a:r>
+              <a:rPr lang="fr-FR" dirty="0"/>
+              <a:t>(20)</a:t>
+            </a:r>
+          </a:p>
+          <a:p>
+            <a:r>
+              <a:rPr lang="fr-FR" dirty="0"/>
+              <a:t>Regroupement des données : </a:t>
+            </a:r>
+            <a:r>
+              <a:rPr lang="fr-FR" dirty="0" err="1"/>
+              <a:t>df_Social</a:t>
+            </a:r>
+            <a:r>
+              <a:rPr lang="fr-FR" dirty="0"/>
+              <a:t> = </a:t>
+            </a:r>
+            <a:r>
+              <a:rPr lang="fr-FR" dirty="0" err="1"/>
+              <a:t>pd.concat</a:t>
+            </a:r>
+            <a:r>
+              <a:rPr lang="fr-FR" dirty="0"/>
+              <a:t>([</a:t>
+            </a:r>
+            <a:r>
+              <a:rPr lang="fr-FR" dirty="0" err="1"/>
+              <a:t>dfRSA</a:t>
+            </a:r>
+            <a:r>
+              <a:rPr lang="fr-FR" dirty="0"/>
+              <a:t>, </a:t>
+            </a:r>
+            <a:r>
+              <a:rPr lang="fr-FR" dirty="0" err="1"/>
+              <a:t>dfFSL</a:t>
+            </a:r>
+            <a:r>
+              <a:rPr lang="fr-FR" dirty="0"/>
+              <a:t>, </a:t>
+            </a:r>
+            <a:r>
+              <a:rPr lang="fr-FR" dirty="0" err="1"/>
+              <a:t>dfTS</a:t>
+            </a:r>
+            <a:r>
+              <a:rPr lang="fr-FR" dirty="0"/>
+              <a:t>])</a:t>
+            </a:r>
+          </a:p>
+          <a:p>
+            <a:pPr marL="0" indent="0">
+              <a:buNone/>
+            </a:pPr>
+            <a:r>
+              <a:rPr lang="fr-FR" dirty="0" err="1"/>
+              <a:t>df_Social.head</a:t>
+            </a:r>
+            <a:r>
+              <a:rPr lang="fr-FR" dirty="0"/>
+              <a:t>(20)</a:t>
+            </a:r>
+          </a:p>
+          <a:p>
+            <a:r>
+              <a:rPr lang="fr-FR" dirty="0"/>
+              <a:t>Nettoyage des données : </a:t>
+            </a:r>
+            <a:r>
+              <a:rPr lang="fr-FR" dirty="0">
+                <a:solidFill>
+                  <a:srgbClr val="FF0000"/>
+                </a:solidFill>
+                <a:sym typeface="Wingdings 2" panose="05020102010507070707" pitchFamily="18" charset="2"/>
+              </a:rPr>
+              <a:t></a:t>
+            </a:r>
+          </a:p>
           <a:p>
             <a:endParaRPr lang="fr-FR" dirty="0"/>
           </a:p>

</xml_diff>